<commit_message>
small updates to week 5 lecture
</commit_message>
<xml_diff>
--- a/Week 5 -- 1D spatial models/Lecture/Lecture 5 -- 1D spatial models.pptx
+++ b/Week 5 -- 1D spatial models/Lecture/Lecture 5 -- 1D spatial models.pptx
@@ -215,7 +215,7 @@
           <a:p>
             <a:fld id="{1522831B-4FE3-4D45-950B-0D2C6BB2DD76}" type="datetimeFigureOut">
               <a:rPr lang="en-US" smtClean="0"/>
-              <a:t>4/25/2016</a:t>
+              <a:t>4/26/2016</a:t>
             </a:fld>
             <a:endParaRPr lang="en-US"/>
           </a:p>
@@ -3565,8 +3565,8 @@
           </a:p>
         </p:txBody>
       </p:sp>
-      <mc:AlternateContent xmlns:mc="http://schemas.openxmlformats.org/markup-compatibility/2006" xmlns:a14="http://schemas.microsoft.com/office/drawing/2010/main">
-        <mc:Choice Requires="a14">
+      <mc:AlternateContent xmlns:mc="http://schemas.openxmlformats.org/markup-compatibility/2006">
+        <mc:Choice xmlns:a14="http://schemas.microsoft.com/office/drawing/2010/main" Requires="a14">
           <p:sp>
             <p:nvSpPr>
               <p:cNvPr id="3" name="Content Placeholder 2"/>
@@ -3848,7 +3848,7 @@
                         <a:latin typeface="Cambria Math" panose="02040503050406030204" pitchFamily="18" charset="0"/>
                         <a:ea typeface="Cambria Math" panose="02040503050406030204" pitchFamily="18" charset="0"/>
                       </a:rPr>
-                      <m:t>0</m:t>
+                      <m:t>1</m:t>
                     </m:r>
                   </m:oMath>
                 </a14:m>
@@ -3863,7 +3863,7 @@
             </p:txBody>
           </p:sp>
         </mc:Choice>
-        <mc:Fallback xmlns="">
+        <mc:Fallback>
           <p:sp>
             <p:nvSpPr>
               <p:cNvPr id="3" name="Content Placeholder 2"/>
@@ -3941,6 +3941,13 @@
   <p:clrMapOvr>
     <a:masterClrMapping/>
   </p:clrMapOvr>
+  <p:timing>
+    <p:tnLst>
+      <p:par>
+        <p:cTn id="1" dur="indefinite" restart="never" nodeType="tmRoot"/>
+      </p:par>
+    </p:tnLst>
+  </p:timing>
 </p:sld>
 </file>
 
@@ -4370,7 +4377,7 @@
           <a:graphicData uri="http://schemas.openxmlformats.org/presentationml/2006/ole">
             <mc:AlternateContent xmlns:mc="http://schemas.openxmlformats.org/markup-compatibility/2006">
               <mc:Choice xmlns:v="urn:schemas-microsoft-com:vml" Requires="v">
-                <p:oleObj spid="_x0000_s6158" name="Equation" r:id="rId4" imgW="2654280" imgH="1168200" progId="Equation.DSMT4">
+                <p:oleObj spid="_x0000_s6160" name="Equation" r:id="rId4" imgW="2654280" imgH="1168200" progId="Equation.DSMT4">
                   <p:embed/>
                 </p:oleObj>
               </mc:Choice>
@@ -5661,7 +5668,7 @@
           <a:graphicData uri="http://schemas.openxmlformats.org/presentationml/2006/ole">
             <mc:AlternateContent xmlns:mc="http://schemas.openxmlformats.org/markup-compatibility/2006">
               <mc:Choice xmlns:v="urn:schemas-microsoft-com:vml" Requires="v">
-                <p:oleObj spid="_x0000_s5140" name="Equation" r:id="rId4" imgW="2781000" imgH="1168200" progId="Equation.DSMT4">
+                <p:oleObj spid="_x0000_s5142" name="Equation" r:id="rId4" imgW="2781000" imgH="1168200" progId="Equation.DSMT4">
                   <p:embed/>
                 </p:oleObj>
               </mc:Choice>
@@ -6424,8 +6431,8 @@
           </a:p>
         </p:txBody>
       </p:sp>
-      <mc:AlternateContent xmlns:mc="http://schemas.openxmlformats.org/markup-compatibility/2006">
-        <mc:Choice xmlns:a14="http://schemas.microsoft.com/office/drawing/2010/main" Requires="a14">
+      <mc:AlternateContent xmlns:mc="http://schemas.openxmlformats.org/markup-compatibility/2006" xmlns:a14="http://schemas.microsoft.com/office/drawing/2010/main">
+        <mc:Choice Requires="a14">
           <p:sp>
             <p:nvSpPr>
               <p:cNvPr id="3" name="Content Placeholder 2"/>
@@ -7146,7 +7153,7 @@
             </p:txBody>
           </p:sp>
         </mc:Choice>
-        <mc:Fallback>
+        <mc:Fallback xmlns="">
           <p:sp>
             <p:nvSpPr>
               <p:cNvPr id="3" name="Content Placeholder 2"/>
@@ -7190,6 +7197,13 @@
   <p:clrMapOvr>
     <a:masterClrMapping/>
   </p:clrMapOvr>
+  <p:timing>
+    <p:tnLst>
+      <p:par>
+        <p:cTn id="1" dur="indefinite" restart="never" nodeType="tmRoot"/>
+      </p:par>
+    </p:tnLst>
+  </p:timing>
 </p:sld>
 </file>
 
@@ -7229,8 +7243,8 @@
           </a:p>
         </p:txBody>
       </p:sp>
-      <mc:AlternateContent xmlns:mc="http://schemas.openxmlformats.org/markup-compatibility/2006">
-        <mc:Choice xmlns:a14="http://schemas.microsoft.com/office/drawing/2010/main" Requires="a14">
+      <mc:AlternateContent xmlns:mc="http://schemas.openxmlformats.org/markup-compatibility/2006" xmlns:a14="http://schemas.microsoft.com/office/drawing/2010/main">
+        <mc:Choice Requires="a14">
           <p:sp>
             <p:nvSpPr>
               <p:cNvPr id="3" name="Content Placeholder 2"/>
@@ -7780,7 +7794,7 @@
                       <m:sSub>
                         <m:sSubPr>
                           <m:ctrlPr>
-                            <a:rPr lang="en-US" b="1" i="0" smtClean="0">
+                            <a:rPr lang="en-US" b="1" i="1" smtClean="0">
                               <a:latin typeface="Cambria Math" panose="02040503050406030204" pitchFamily="18" charset="0"/>
                               <a:ea typeface="Cambria Math" panose="02040503050406030204" pitchFamily="18" charset="0"/>
                             </a:rPr>
@@ -7882,7 +7896,7 @@
             </p:txBody>
           </p:sp>
         </mc:Choice>
-        <mc:Fallback>
+        <mc:Fallback xmlns="">
           <p:sp>
             <p:nvSpPr>
               <p:cNvPr id="3" name="Content Placeholder 2"/>
@@ -7926,6 +7940,13 @@
   <p:clrMapOvr>
     <a:masterClrMapping/>
   </p:clrMapOvr>
+  <p:timing>
+    <p:tnLst>
+      <p:par>
+        <p:cTn id="1" dur="indefinite" restart="never" nodeType="tmRoot"/>
+      </p:par>
+    </p:tnLst>
+  </p:timing>
 </p:sld>
 </file>
 
@@ -9025,6 +9046,13 @@
   <p:clrMapOvr>
     <a:masterClrMapping/>
   </p:clrMapOvr>
+  <p:timing>
+    <p:tnLst>
+      <p:par>
+        <p:cTn id="1" dur="indefinite" restart="never" nodeType="tmRoot"/>
+      </p:par>
+    </p:tnLst>
+  </p:timing>
 </p:sld>
 </file>
 
@@ -9472,8 +9500,8 @@
           </a:p>
         </p:txBody>
       </p:sp>
-      <mc:AlternateContent xmlns:mc="http://schemas.openxmlformats.org/markup-compatibility/2006">
-        <mc:Choice xmlns:a14="http://schemas.microsoft.com/office/drawing/2010/main" Requires="a14">
+      <mc:AlternateContent xmlns:mc="http://schemas.openxmlformats.org/markup-compatibility/2006" xmlns:a14="http://schemas.microsoft.com/office/drawing/2010/main">
+        <mc:Choice Requires="a14">
           <p:sp>
             <p:nvSpPr>
               <p:cNvPr id="3" name="Content Placeholder 2"/>
@@ -9682,15 +9710,7 @@
                 </a14:m>
                 <a:r>
                   <a:rPr lang="en-US" dirty="0" smtClean="0"/>
-                  <a:t> </a:t>
-                </a:r>
-                <a:r>
-                  <a:rPr lang="en-US" dirty="0" smtClean="0"/>
-                  <a:t>is a count sample for </a:t>
-                </a:r>
-                <a:r>
-                  <a:rPr lang="en-US" dirty="0" smtClean="0"/>
-                  <a:t>site </a:t>
+                  <a:t> is a count sample for site </a:t>
                 </a:r>
                 <a:r>
                   <a:rPr lang="en-US" i="1" dirty="0" smtClean="0"/>
@@ -9760,11 +9780,7 @@
                 </a14:m>
                 <a:r>
                   <a:rPr lang="en-US" dirty="0" smtClean="0"/>
-                  <a:t> is the expected </a:t>
-                </a:r>
-                <a:r>
-                  <a:rPr lang="en-US" dirty="0" smtClean="0"/>
-                  <a:t>value</a:t>
+                  <a:t> is the expected value</a:t>
                 </a:r>
               </a:p>
               <a:p>
@@ -9827,7 +9843,7 @@
             </p:txBody>
           </p:sp>
         </mc:Choice>
-        <mc:Fallback>
+        <mc:Fallback xmlns="">
           <p:sp>
             <p:nvSpPr>
               <p:cNvPr id="3" name="Content Placeholder 2"/>

</xml_diff>